<commit_message>
Firstthird commit on this branch
</commit_message>
<xml_diff>
--- a/Threads.pptx
+++ b/Threads.pptx
@@ -15,6 +15,7 @@
     <p:sldId id="262" r:id="rId9"/>
     <p:sldId id="263" r:id="rId10"/>
     <p:sldId id="264" r:id="rId11"/>
+    <p:sldId id="266" r:id="rId12"/>
   </p:sldIdLst>
   <p:sldSz cx="9144000" cy="6858000" type="screen4x3"/>
   <p:notesSz cx="6858000" cy="9144000"/>
@@ -260,7 +261,7 @@
             <a:fld id="{1D8BD707-D9CF-40AE-B4C6-C98DA3205C09}" type="datetimeFigureOut">
               <a:rPr lang="en-US" smtClean="0"/>
               <a:pPr/>
-              <a:t>1/2/2023</a:t>
+              <a:t>1/3/2023</a:t>
             </a:fld>
             <a:endParaRPr lang="en-US"/>
           </a:p>
@@ -621,7 +622,7 @@
             <a:fld id="{1D8BD707-D9CF-40AE-B4C6-C98DA3205C09}" type="datetimeFigureOut">
               <a:rPr lang="en-US" smtClean="0"/>
               <a:pPr/>
-              <a:t>1/2/2023</a:t>
+              <a:t>1/3/2023</a:t>
             </a:fld>
             <a:endParaRPr lang="en-US"/>
           </a:p>
@@ -798,7 +799,7 @@
             <a:fld id="{1D8BD707-D9CF-40AE-B4C6-C98DA3205C09}" type="datetimeFigureOut">
               <a:rPr lang="en-US" smtClean="0"/>
               <a:pPr/>
-              <a:t>1/2/2023</a:t>
+              <a:t>1/3/2023</a:t>
             </a:fld>
             <a:endParaRPr lang="en-US"/>
           </a:p>
@@ -1035,7 +1036,7 @@
             <a:fld id="{1D8BD707-D9CF-40AE-B4C6-C98DA3205C09}" type="datetimeFigureOut">
               <a:rPr lang="en-US" smtClean="0"/>
               <a:pPr/>
-              <a:t>1/2/2023</a:t>
+              <a:t>1/3/2023</a:t>
             </a:fld>
             <a:endParaRPr lang="en-US"/>
           </a:p>
@@ -1306,7 +1307,7 @@
             <a:fld id="{1D8BD707-D9CF-40AE-B4C6-C98DA3205C09}" type="datetimeFigureOut">
               <a:rPr lang="en-US" smtClean="0"/>
               <a:pPr/>
-              <a:t>1/2/2023</a:t>
+              <a:t>1/3/2023</a:t>
             </a:fld>
             <a:endParaRPr lang="en-US"/>
           </a:p>
@@ -1528,7 +1529,7 @@
             <a:fld id="{1D8BD707-D9CF-40AE-B4C6-C98DA3205C09}" type="datetimeFigureOut">
               <a:rPr lang="en-US" smtClean="0"/>
               <a:pPr/>
-              <a:t>1/2/2023</a:t>
+              <a:t>1/3/2023</a:t>
             </a:fld>
             <a:endParaRPr lang="en-US"/>
           </a:p>
@@ -1882,7 +1883,7 @@
             <a:fld id="{1D8BD707-D9CF-40AE-B4C6-C98DA3205C09}" type="datetimeFigureOut">
               <a:rPr lang="en-US" smtClean="0"/>
               <a:pPr/>
-              <a:t>1/2/2023</a:t>
+              <a:t>1/3/2023</a:t>
             </a:fld>
             <a:endParaRPr lang="en-US"/>
           </a:p>
@@ -2116,7 +2117,7 @@
             <a:fld id="{1D8BD707-D9CF-40AE-B4C6-C98DA3205C09}" type="datetimeFigureOut">
               <a:rPr lang="en-US" smtClean="0"/>
               <a:pPr/>
-              <a:t>1/2/2023</a:t>
+              <a:t>1/3/2023</a:t>
             </a:fld>
             <a:endParaRPr lang="en-US"/>
           </a:p>
@@ -2258,7 +2259,7 @@
             <a:fld id="{1D8BD707-D9CF-40AE-B4C6-C98DA3205C09}" type="datetimeFigureOut">
               <a:rPr lang="en-US" smtClean="0"/>
               <a:pPr/>
-              <a:t>1/2/2023</a:t>
+              <a:t>1/3/2023</a:t>
             </a:fld>
             <a:endParaRPr lang="en-US"/>
           </a:p>
@@ -2537,7 +2538,7 @@
             <a:fld id="{1D8BD707-D9CF-40AE-B4C6-C98DA3205C09}" type="datetimeFigureOut">
               <a:rPr lang="en-US" smtClean="0"/>
               <a:pPr/>
-              <a:t>1/2/2023</a:t>
+              <a:t>1/3/2023</a:t>
             </a:fld>
             <a:endParaRPr lang="en-US"/>
           </a:p>
@@ -2946,7 +2947,7 @@
             <a:fld id="{1D8BD707-D9CF-40AE-B4C6-C98DA3205C09}" type="datetimeFigureOut">
               <a:rPr lang="en-US" smtClean="0"/>
               <a:pPr/>
-              <a:t>1/2/2023</a:t>
+              <a:t>1/3/2023</a:t>
             </a:fld>
             <a:endParaRPr lang="en-US"/>
           </a:p>
@@ -3286,7 +3287,7 @@
             <a:fld id="{1D8BD707-D9CF-40AE-B4C6-C98DA3205C09}" type="datetimeFigureOut">
               <a:rPr lang="en-US" smtClean="0"/>
               <a:pPr/>
-              <a:t>1/2/2023</a:t>
+              <a:t>1/3/2023</a:t>
             </a:fld>
             <a:endParaRPr lang="en-US"/>
           </a:p>
@@ -3951,6 +3952,10 @@
             <a:pPr marL="0" indent="0">
               <a:buNone/>
             </a:pPr>
+            <a:r>
+              <a:rPr lang="en-US" dirty="0"/>
+              <a:t>In the case of a thread pool, a group of fixed-size threads is created. A thread from the thread pool is pulled out and assigned a job by the service provider. After completion of the job, the thread is contained in the thread pool again.</a:t>
+            </a:r>
             <a:endParaRPr lang="en-US" dirty="0"/>
           </a:p>
         </p:txBody>
@@ -3959,6 +3964,178 @@
     <p:extLst>
       <p:ext uri="{BB962C8B-B14F-4D97-AF65-F5344CB8AC3E}">
         <p14:creationId xmlns:p14="http://schemas.microsoft.com/office/powerpoint/2010/main" val="1597270336"/>
+      </p:ext>
+    </p:extLst>
+  </p:cSld>
+  <p:clrMapOvr>
+    <a:masterClrMapping/>
+  </p:clrMapOvr>
+</p:sld>
+</file>
+
+<file path=ppt/slides/slide11.xml><?xml version="1.0" encoding="utf-8"?>
+<p:sld xmlns:a="http://schemas.openxmlformats.org/drawingml/2006/main" xmlns:r="http://schemas.openxmlformats.org/officeDocument/2006/relationships" xmlns:p="http://schemas.openxmlformats.org/presentationml/2006/main">
+  <p:cSld>
+    <p:spTree>
+      <p:nvGrpSpPr>
+        <p:cNvPr id="1" name=""/>
+        <p:cNvGrpSpPr/>
+        <p:nvPr/>
+      </p:nvGrpSpPr>
+      <p:grpSpPr>
+        <a:xfrm>
+          <a:off x="0" y="0"/>
+          <a:ext cx="0" cy="0"/>
+          <a:chOff x="0" y="0"/>
+          <a:chExt cx="0" cy="0"/>
+        </a:xfrm>
+      </p:grpSpPr>
+      <p:sp>
+        <p:nvSpPr>
+          <p:cNvPr id="2" name="Title 1"/>
+          <p:cNvSpPr>
+            <a:spLocks noGrp="1"/>
+          </p:cNvSpPr>
+          <p:nvPr>
+            <p:ph type="title"/>
+          </p:nvPr>
+        </p:nvSpPr>
+        <p:spPr/>
+        <p:txBody>
+          <a:bodyPr/>
+          <a:lstStyle/>
+          <a:p>
+            <a:pPr algn="ctr"/>
+            <a:r>
+              <a:rPr lang="en-US" b="1" dirty="0" smtClean="0"/>
+              <a:t>Thread pool methods</a:t>
+            </a:r>
+            <a:endParaRPr lang="en-US" b="1" dirty="0"/>
+          </a:p>
+        </p:txBody>
+      </p:sp>
+      <p:sp>
+        <p:nvSpPr>
+          <p:cNvPr id="3" name="Content Placeholder 2"/>
+          <p:cNvSpPr>
+            <a:spLocks noGrp="1"/>
+          </p:cNvSpPr>
+          <p:nvPr>
+            <p:ph sz="quarter" idx="1"/>
+          </p:nvPr>
+        </p:nvSpPr>
+        <p:spPr/>
+        <p:txBody>
+          <a:bodyPr/>
+          <a:lstStyle/>
+          <a:p>
+            <a:r>
+              <a:rPr lang="en-US" dirty="0"/>
+              <a:t>Thread Pool Methods</a:t>
+            </a:r>
+          </a:p>
+          <a:p>
+            <a:pPr marL="0" indent="0">
+              <a:buNone/>
+            </a:pPr>
+            <a:r>
+              <a:rPr lang="en-US" b="1" dirty="0" smtClean="0"/>
+              <a:t> </a:t>
+            </a:r>
+            <a:r>
+              <a:rPr lang="en-US" b="1" dirty="0" err="1" smtClean="0"/>
+              <a:t>newFixedThreadPool</a:t>
+            </a:r>
+            <a:r>
+              <a:rPr lang="en-US" b="1" dirty="0" smtClean="0"/>
+              <a:t>(</a:t>
+            </a:r>
+            <a:r>
+              <a:rPr lang="en-US" b="1" dirty="0" err="1" smtClean="0"/>
+              <a:t>int</a:t>
+            </a:r>
+            <a:r>
+              <a:rPr lang="en-US" b="1" dirty="0" smtClean="0"/>
+              <a:t> </a:t>
+            </a:r>
+            <a:r>
+              <a:rPr lang="en-US" b="1" dirty="0"/>
+              <a:t>s):</a:t>
+            </a:r>
+            <a:r>
+              <a:rPr lang="en-US" dirty="0"/>
+              <a:t> The method creates a thread pool of the fixed size s</a:t>
+            </a:r>
+            <a:r>
+              <a:rPr lang="en-US" dirty="0" smtClean="0"/>
+              <a:t>.</a:t>
+            </a:r>
+          </a:p>
+          <a:p>
+            <a:pPr marL="0" indent="0">
+              <a:buNone/>
+            </a:pPr>
+            <a:endParaRPr lang="en-US" dirty="0"/>
+          </a:p>
+          <a:p>
+            <a:pPr marL="0" indent="0">
+              <a:buNone/>
+            </a:pPr>
+            <a:r>
+              <a:rPr lang="en-US" b="1" dirty="0" smtClean="0"/>
+              <a:t> </a:t>
+            </a:r>
+            <a:r>
+              <a:rPr lang="en-US" b="1" dirty="0" err="1" smtClean="0"/>
+              <a:t>newCachedThreadPool</a:t>
+            </a:r>
+            <a:r>
+              <a:rPr lang="en-US" b="1" dirty="0"/>
+              <a:t>():</a:t>
+            </a:r>
+            <a:r>
+              <a:rPr lang="en-US" dirty="0"/>
+              <a:t> The method creates a new thread pool that creates the new threads when needed but will still use the previously created thread whenever they are available to use</a:t>
+            </a:r>
+            <a:r>
+              <a:rPr lang="en-US" dirty="0" smtClean="0"/>
+              <a:t>.</a:t>
+            </a:r>
+          </a:p>
+          <a:p>
+            <a:pPr marL="0" indent="0">
+              <a:buNone/>
+            </a:pPr>
+            <a:endParaRPr lang="en-US" dirty="0"/>
+          </a:p>
+          <a:p>
+            <a:pPr marL="0" indent="0">
+              <a:buNone/>
+            </a:pPr>
+            <a:r>
+              <a:rPr lang="en-US" b="1" dirty="0" smtClean="0"/>
+              <a:t> </a:t>
+            </a:r>
+            <a:r>
+              <a:rPr lang="en-US" b="1" dirty="0" err="1" smtClean="0"/>
+              <a:t>newSingleThreadExecutor</a:t>
+            </a:r>
+            <a:r>
+              <a:rPr lang="en-US" b="1" dirty="0"/>
+              <a:t>():</a:t>
+            </a:r>
+            <a:r>
+              <a:rPr lang="en-US" dirty="0"/>
+              <a:t> The method creates a new thread.</a:t>
+            </a:r>
+            <a:endParaRPr lang="en-US" dirty="0"/>
+          </a:p>
+        </p:txBody>
+      </p:sp>
+    </p:spTree>
+    <p:extLst>
+      <p:ext uri="{BB962C8B-B14F-4D97-AF65-F5344CB8AC3E}">
+        <p14:creationId xmlns:p14="http://schemas.microsoft.com/office/powerpoint/2010/main" val="2713790190"/>
       </p:ext>
     </p:extLst>
   </p:cSld>
@@ -4019,7 +4196,12 @@
             <p:ph sz="quarter" idx="1"/>
           </p:nvPr>
         </p:nvSpPr>
-        <p:spPr/>
+        <p:spPr>
+          <a:xfrm>
+            <a:off x="304800" y="1219200"/>
+            <a:ext cx="8458200" cy="5105400"/>
+          </a:xfrm>
+        </p:spPr>
         <p:txBody>
           <a:bodyPr/>
           <a:lstStyle/>
@@ -4715,7 +4897,6 @@
               <a:rPr lang="en-US" sz="1600" dirty="0"/>
               <a:t>a newly created thread that has not yet started the execution</a:t>
             </a:r>
-            <a:endParaRPr lang="en-US" sz="1600" dirty="0"/>
           </a:p>
           <a:p>
             <a:pPr marL="514350" indent="-514350">
@@ -4730,7 +4911,6 @@
               <a:rPr lang="en-US" sz="1600" dirty="0"/>
               <a:t>either running or ready for execution but it's waiting for resource allocation</a:t>
             </a:r>
-            <a:endParaRPr lang="en-US" sz="1600" dirty="0"/>
           </a:p>
           <a:p>
             <a:pPr marL="514350" indent="-514350">
@@ -4745,7 +4925,6 @@
               <a:rPr lang="en-US" sz="1600" dirty="0"/>
               <a:t>waiting to acquire a monitor lock to enter or re-enter a synchronized block/method</a:t>
             </a:r>
-            <a:endParaRPr lang="en-US" sz="1600" dirty="0"/>
           </a:p>
           <a:p>
             <a:pPr marL="514350" indent="-514350">
@@ -4760,7 +4939,6 @@
               <a:rPr lang="en-US" sz="1600" dirty="0"/>
               <a:t>waiting for some other thread to perform a particular action without any time limit</a:t>
             </a:r>
-            <a:endParaRPr lang="en-US" sz="1600" dirty="0"/>
           </a:p>
           <a:p>
             <a:pPr marL="514350" indent="-514350">
@@ -4779,7 +4957,6 @@
               <a:rPr lang="en-US" sz="1600" dirty="0"/>
               <a:t>waiting for some other thread to perform a specific action for a specified period</a:t>
             </a:r>
-            <a:endParaRPr lang="en-US" sz="1600" dirty="0"/>
           </a:p>
           <a:p>
             <a:pPr marL="514350" indent="-514350">
@@ -4798,7 +4975,6 @@
               <a:rPr lang="en-US" sz="1600" dirty="0"/>
               <a:t>has completed its execution</a:t>
             </a:r>
-            <a:endParaRPr lang="en-US" sz="1600" dirty="0"/>
           </a:p>
         </p:txBody>
       </p:sp>
@@ -5245,33 +5421,8 @@
             </a:r>
             <a:r>
               <a:rPr lang="en-US" sz="2400" dirty="0"/>
-              <a:t> interface and provide implementation in </a:t>
-            </a:r>
-            <a:r>
-              <a:rPr lang="en-US" sz="2400" dirty="0"/>
-              <a:t>public void run()</a:t>
-            </a:r>
-            <a:r>
-              <a:rPr lang="en-US" sz="2400" dirty="0"/>
-              <a:t> method. To use this class as Thread, we need to create a Thread object by passing object of this runnable class and then call </a:t>
-            </a:r>
-            <a:r>
-              <a:rPr lang="en-US" sz="2400" dirty="0"/>
-              <a:t>start()</a:t>
-            </a:r>
-            <a:r>
-              <a:rPr lang="en-US" sz="2400" dirty="0"/>
-              <a:t> method to execute the </a:t>
-            </a:r>
-            <a:r>
-              <a:rPr lang="en-US" sz="2400" dirty="0"/>
-              <a:t>run()</a:t>
-            </a:r>
-            <a:r>
-              <a:rPr lang="en-US" sz="2400" dirty="0"/>
-              <a:t> method in a separate thread. Here is a java thread example by implementing Runnable interface.</a:t>
-            </a:r>
-            <a:endParaRPr lang="en-US" sz="2400" dirty="0"/>
+              <a:t> interface and provide implementation in public void run() method. To use this class as Thread, we need to create a Thread object by passing object of this runnable class and then call start() method to execute the run() method in a separate thread. Here is a java thread example by implementing Runnable interface.</a:t>
+            </a:r>
           </a:p>
         </p:txBody>
       </p:sp>

</xml_diff>

<commit_message>
Firstfourth commit on this branch
</commit_message>
<xml_diff>
--- a/Threads.pptx
+++ b/Threads.pptx
@@ -261,7 +261,7 @@
             <a:fld id="{1D8BD707-D9CF-40AE-B4C6-C98DA3205C09}" type="datetimeFigureOut">
               <a:rPr lang="en-US" smtClean="0"/>
               <a:pPr/>
-              <a:t>1/3/2023</a:t>
+              <a:t>1/4/2023</a:t>
             </a:fld>
             <a:endParaRPr lang="en-US"/>
           </a:p>
@@ -622,7 +622,7 @@
             <a:fld id="{1D8BD707-D9CF-40AE-B4C6-C98DA3205C09}" type="datetimeFigureOut">
               <a:rPr lang="en-US" smtClean="0"/>
               <a:pPr/>
-              <a:t>1/3/2023</a:t>
+              <a:t>1/4/2023</a:t>
             </a:fld>
             <a:endParaRPr lang="en-US"/>
           </a:p>
@@ -799,7 +799,7 @@
             <a:fld id="{1D8BD707-D9CF-40AE-B4C6-C98DA3205C09}" type="datetimeFigureOut">
               <a:rPr lang="en-US" smtClean="0"/>
               <a:pPr/>
-              <a:t>1/3/2023</a:t>
+              <a:t>1/4/2023</a:t>
             </a:fld>
             <a:endParaRPr lang="en-US"/>
           </a:p>
@@ -1036,7 +1036,7 @@
             <a:fld id="{1D8BD707-D9CF-40AE-B4C6-C98DA3205C09}" type="datetimeFigureOut">
               <a:rPr lang="en-US" smtClean="0"/>
               <a:pPr/>
-              <a:t>1/3/2023</a:t>
+              <a:t>1/4/2023</a:t>
             </a:fld>
             <a:endParaRPr lang="en-US"/>
           </a:p>
@@ -1307,7 +1307,7 @@
             <a:fld id="{1D8BD707-D9CF-40AE-B4C6-C98DA3205C09}" type="datetimeFigureOut">
               <a:rPr lang="en-US" smtClean="0"/>
               <a:pPr/>
-              <a:t>1/3/2023</a:t>
+              <a:t>1/4/2023</a:t>
             </a:fld>
             <a:endParaRPr lang="en-US"/>
           </a:p>
@@ -1529,7 +1529,7 @@
             <a:fld id="{1D8BD707-D9CF-40AE-B4C6-C98DA3205C09}" type="datetimeFigureOut">
               <a:rPr lang="en-US" smtClean="0"/>
               <a:pPr/>
-              <a:t>1/3/2023</a:t>
+              <a:t>1/4/2023</a:t>
             </a:fld>
             <a:endParaRPr lang="en-US"/>
           </a:p>
@@ -1883,7 +1883,7 @@
             <a:fld id="{1D8BD707-D9CF-40AE-B4C6-C98DA3205C09}" type="datetimeFigureOut">
               <a:rPr lang="en-US" smtClean="0"/>
               <a:pPr/>
-              <a:t>1/3/2023</a:t>
+              <a:t>1/4/2023</a:t>
             </a:fld>
             <a:endParaRPr lang="en-US"/>
           </a:p>
@@ -2117,7 +2117,7 @@
             <a:fld id="{1D8BD707-D9CF-40AE-B4C6-C98DA3205C09}" type="datetimeFigureOut">
               <a:rPr lang="en-US" smtClean="0"/>
               <a:pPr/>
-              <a:t>1/3/2023</a:t>
+              <a:t>1/4/2023</a:t>
             </a:fld>
             <a:endParaRPr lang="en-US"/>
           </a:p>
@@ -2259,7 +2259,7 @@
             <a:fld id="{1D8BD707-D9CF-40AE-B4C6-C98DA3205C09}" type="datetimeFigureOut">
               <a:rPr lang="en-US" smtClean="0"/>
               <a:pPr/>
-              <a:t>1/3/2023</a:t>
+              <a:t>1/4/2023</a:t>
             </a:fld>
             <a:endParaRPr lang="en-US"/>
           </a:p>
@@ -2538,7 +2538,7 @@
             <a:fld id="{1D8BD707-D9CF-40AE-B4C6-C98DA3205C09}" type="datetimeFigureOut">
               <a:rPr lang="en-US" smtClean="0"/>
               <a:pPr/>
-              <a:t>1/3/2023</a:t>
+              <a:t>1/4/2023</a:t>
             </a:fld>
             <a:endParaRPr lang="en-US"/>
           </a:p>
@@ -2947,7 +2947,7 @@
             <a:fld id="{1D8BD707-D9CF-40AE-B4C6-C98DA3205C09}" type="datetimeFigureOut">
               <a:rPr lang="en-US" smtClean="0"/>
               <a:pPr/>
-              <a:t>1/3/2023</a:t>
+              <a:t>1/4/2023</a:t>
             </a:fld>
             <a:endParaRPr lang="en-US"/>
           </a:p>
@@ -3287,7 +3287,7 @@
             <a:fld id="{1D8BD707-D9CF-40AE-B4C6-C98DA3205C09}" type="datetimeFigureOut">
               <a:rPr lang="en-US" smtClean="0"/>
               <a:pPr/>
-              <a:t>1/3/2023</a:t>
+              <a:t>1/4/2023</a:t>
             </a:fld>
             <a:endParaRPr lang="en-US"/>
           </a:p>
@@ -3956,7 +3956,6 @@
               <a:rPr lang="en-US" dirty="0"/>
               <a:t>In the case of a thread pool, a group of fixed-size threads is created. A thread from the thread pool is pulled out and assigned a job by the service provider. After completion of the job, the thread is contained in the thread pool again.</a:t>
             </a:r>
-            <a:endParaRPr lang="en-US" dirty="0"/>
           </a:p>
         </p:txBody>
       </p:sp>
@@ -4128,7 +4127,6 @@
               <a:rPr lang="en-US" dirty="0"/>
               <a:t> The method creates a new thread.</a:t>
             </a:r>
-            <a:endParaRPr lang="en-US" dirty="0"/>
           </a:p>
         </p:txBody>
       </p:sp>
@@ -4590,12 +4588,12 @@
               <a:t>Thread class provide constructors and methods to create and perform operations on a </a:t>
             </a:r>
             <a:r>
-              <a:rPr lang="en-US" dirty="0" err="1"/>
-              <a:t>thread.Thread</a:t>
+              <a:rPr lang="en-US" dirty="0" smtClean="0"/>
+              <a:t>thread . Thread </a:t>
             </a:r>
             <a:r>
               <a:rPr lang="en-US" dirty="0"/>
-              <a:t> class extends Object class and implements Runnable interface</a:t>
+              <a:t>class extends Object class and implements Runnable interface</a:t>
             </a:r>
             <a:r>
               <a:rPr lang="en-US" dirty="0" smtClean="0"/>

</xml_diff>